<commit_message>
keepSpeed => reduced autoRotateBackSpeed
</commit_message>
<xml_diff>
--- a/Documentation/Tastatur.pptx
+++ b/Documentation/Tastatur.pptx
@@ -245,7 +245,7 @@
           <a:p>
             <a:fld id="{A5E903F8-D08C-420F-92B0-BC9B547C8ADE}" type="datetimeFigureOut">
               <a:rPr lang="en-US" smtClean="0"/>
-              <a:t>3/12/2015</a:t>
+              <a:t>9/24/2015</a:t>
             </a:fld>
             <a:endParaRPr lang="en-US"/>
           </a:p>
@@ -415,7 +415,7 @@
           <a:p>
             <a:fld id="{A5E903F8-D08C-420F-92B0-BC9B547C8ADE}" type="datetimeFigureOut">
               <a:rPr lang="en-US" smtClean="0"/>
-              <a:t>3/12/2015</a:t>
+              <a:t>9/24/2015</a:t>
             </a:fld>
             <a:endParaRPr lang="en-US"/>
           </a:p>
@@ -595,7 +595,7 @@
           <a:p>
             <a:fld id="{A5E903F8-D08C-420F-92B0-BC9B547C8ADE}" type="datetimeFigureOut">
               <a:rPr lang="en-US" smtClean="0"/>
-              <a:t>3/12/2015</a:t>
+              <a:t>9/24/2015</a:t>
             </a:fld>
             <a:endParaRPr lang="en-US"/>
           </a:p>
@@ -765,7 +765,7 @@
           <a:p>
             <a:fld id="{A5E903F8-D08C-420F-92B0-BC9B547C8ADE}" type="datetimeFigureOut">
               <a:rPr lang="en-US" smtClean="0"/>
-              <a:t>3/12/2015</a:t>
+              <a:t>9/24/2015</a:t>
             </a:fld>
             <a:endParaRPr lang="en-US"/>
           </a:p>
@@ -1011,7 +1011,7 @@
           <a:p>
             <a:fld id="{A5E903F8-D08C-420F-92B0-BC9B547C8ADE}" type="datetimeFigureOut">
               <a:rPr lang="en-US" smtClean="0"/>
-              <a:t>3/12/2015</a:t>
+              <a:t>9/24/2015</a:t>
             </a:fld>
             <a:endParaRPr lang="en-US"/>
           </a:p>
@@ -1243,7 +1243,7 @@
           <a:p>
             <a:fld id="{A5E903F8-D08C-420F-92B0-BC9B547C8ADE}" type="datetimeFigureOut">
               <a:rPr lang="en-US" smtClean="0"/>
-              <a:t>3/12/2015</a:t>
+              <a:t>9/24/2015</a:t>
             </a:fld>
             <a:endParaRPr lang="en-US"/>
           </a:p>
@@ -1610,7 +1610,7 @@
           <a:p>
             <a:fld id="{A5E903F8-D08C-420F-92B0-BC9B547C8ADE}" type="datetimeFigureOut">
               <a:rPr lang="en-US" smtClean="0"/>
-              <a:t>3/12/2015</a:t>
+              <a:t>9/24/2015</a:t>
             </a:fld>
             <a:endParaRPr lang="en-US"/>
           </a:p>
@@ -1728,7 +1728,7 @@
           <a:p>
             <a:fld id="{A5E903F8-D08C-420F-92B0-BC9B547C8ADE}" type="datetimeFigureOut">
               <a:rPr lang="en-US" smtClean="0"/>
-              <a:t>3/12/2015</a:t>
+              <a:t>9/24/2015</a:t>
             </a:fld>
             <a:endParaRPr lang="en-US"/>
           </a:p>
@@ -1823,7 +1823,7 @@
           <a:p>
             <a:fld id="{A5E903F8-D08C-420F-92B0-BC9B547C8ADE}" type="datetimeFigureOut">
               <a:rPr lang="en-US" smtClean="0"/>
-              <a:t>3/12/2015</a:t>
+              <a:t>9/24/2015</a:t>
             </a:fld>
             <a:endParaRPr lang="en-US"/>
           </a:p>
@@ -2100,7 +2100,7 @@
           <a:p>
             <a:fld id="{A5E903F8-D08C-420F-92B0-BC9B547C8ADE}" type="datetimeFigureOut">
               <a:rPr lang="en-US" smtClean="0"/>
-              <a:t>3/12/2015</a:t>
+              <a:t>9/24/2015</a:t>
             </a:fld>
             <a:endParaRPr lang="en-US"/>
           </a:p>
@@ -2353,7 +2353,7 @@
           <a:p>
             <a:fld id="{A5E903F8-D08C-420F-92B0-BC9B547C8ADE}" type="datetimeFigureOut">
               <a:rPr lang="en-US" smtClean="0"/>
-              <a:t>3/12/2015</a:t>
+              <a:t>9/24/2015</a:t>
             </a:fld>
             <a:endParaRPr lang="en-US"/>
           </a:p>
@@ -2566,7 +2566,7 @@
           <a:p>
             <a:fld id="{A5E903F8-D08C-420F-92B0-BC9B547C8ADE}" type="datetimeFigureOut">
               <a:rPr lang="en-US" smtClean="0"/>
-              <a:t>3/12/2015</a:t>
+              <a:t>9/24/2015</a:t>
             </a:fld>
             <a:endParaRPr lang="en-US"/>
           </a:p>
@@ -3003,7 +3003,7 @@
         <p:spPr>
           <a:xfrm>
             <a:off x="2798129" y="4290646"/>
-            <a:ext cx="1763392" cy="375139"/>
+            <a:ext cx="1603495" cy="375139"/>
           </a:xfrm>
           <a:prstGeom prst="rect">
             <a:avLst/>
@@ -3089,8 +3089,8 @@
         </p:nvSpPr>
         <p:spPr>
           <a:xfrm>
-            <a:off x="4259984" y="2504851"/>
-            <a:ext cx="1332000" cy="432000"/>
+            <a:off x="4274658" y="2351031"/>
+            <a:ext cx="1188000" cy="432000"/>
           </a:xfrm>
           <a:prstGeom prst="rect">
             <a:avLst/>
@@ -3235,8 +3235,8 @@
         </p:nvSpPr>
         <p:spPr>
           <a:xfrm>
-            <a:off x="4264499" y="3032825"/>
-            <a:ext cx="1332000" cy="432000"/>
+            <a:off x="4279173" y="2879005"/>
+            <a:ext cx="1188000" cy="432000"/>
           </a:xfrm>
           <a:prstGeom prst="rect">
             <a:avLst/>
@@ -3610,7 +3610,10 @@
           <a:noFill/>
           <a:ln w="19050">
             <a:solidFill>
-              <a:schemeClr val="accent6"/>
+              <a:schemeClr val="accent6">
+                <a:lumMod val="60000"/>
+                <a:lumOff val="40000"/>
+              </a:schemeClr>
             </a:solidFill>
           </a:ln>
         </p:spPr>
@@ -3665,10 +3668,7 @@
           <a:noFill/>
           <a:ln w="19050">
             <a:solidFill>
-              <a:schemeClr val="accent6">
-                <a:lumMod val="40000"/>
-                <a:lumOff val="60000"/>
-              </a:schemeClr>
+              <a:schemeClr val="accent6"/>
             </a:solidFill>
           </a:ln>
         </p:spPr>
@@ -3769,8 +3769,8 @@
         </p:nvSpPr>
         <p:spPr>
           <a:xfrm>
-            <a:off x="4081773" y="3560799"/>
-            <a:ext cx="1332000" cy="595120"/>
+            <a:off x="4279173" y="3375087"/>
+            <a:ext cx="1188000" cy="432000"/>
           </a:xfrm>
           <a:prstGeom prst="rect">
             <a:avLst/>
@@ -3813,7 +3813,7 @@
                   <a:schemeClr val="tx1"/>
                 </a:solidFill>
               </a:rPr>
-              <a:t>Automatik / Neutral</a:t>
+              <a:t>Neutral</a:t>
             </a:r>
             <a:r>
               <a:rPr lang="de-DE" sz="4000" dirty="0" smtClean="0">
@@ -3854,8 +3854,8 @@
         </p:nvSpPr>
         <p:spPr>
           <a:xfrm>
-            <a:off x="4836279" y="1916109"/>
-            <a:ext cx="1332000" cy="432000"/>
+            <a:off x="5543851" y="1937881"/>
+            <a:ext cx="1188000" cy="432000"/>
           </a:xfrm>
           <a:prstGeom prst="rect">
             <a:avLst/>
@@ -3942,8 +3942,8 @@
         </p:nvSpPr>
         <p:spPr>
           <a:xfrm>
-            <a:off x="6305681" y="1916109"/>
-            <a:ext cx="1332000" cy="432000"/>
+            <a:off x="7013253" y="1937881"/>
+            <a:ext cx="1188000" cy="432000"/>
           </a:xfrm>
           <a:prstGeom prst="rect">
             <a:avLst/>
@@ -4027,96 +4027,8 @@
         </p:nvSpPr>
         <p:spPr>
           <a:xfrm>
-            <a:off x="4645752" y="4370554"/>
-            <a:ext cx="1332000" cy="432000"/>
-          </a:xfrm>
-          <a:prstGeom prst="rect">
-            <a:avLst/>
-          </a:prstGeom>
-          <a:solidFill>
-            <a:srgbClr val="FFFFFF">
-              <a:alpha val="85000"/>
-            </a:srgbClr>
-          </a:solidFill>
-          <a:ln w="19050">
-            <a:solidFill>
-              <a:schemeClr val="accent6">
-                <a:lumMod val="40000"/>
-                <a:lumOff val="60000"/>
-              </a:schemeClr>
-            </a:solidFill>
-          </a:ln>
-        </p:spPr>
-        <p:style>
-          <a:lnRef idx="2">
-            <a:schemeClr val="accent1">
-              <a:shade val="50000"/>
-            </a:schemeClr>
-          </a:lnRef>
-          <a:fillRef idx="1">
-            <a:schemeClr val="accent1"/>
-          </a:fillRef>
-          <a:effectRef idx="0">
-            <a:schemeClr val="accent1"/>
-          </a:effectRef>
-          <a:fontRef idx="minor">
-            <a:schemeClr val="lt1"/>
-          </a:fontRef>
-        </p:style>
-        <p:txBody>
-          <a:bodyPr rtlCol="0" anchor="ctr"/>
-          <a:lstStyle/>
-          <a:p>
-            <a:pPr algn="ctr"/>
-            <a:r>
-              <a:rPr lang="de-DE" sz="1600" dirty="0" smtClean="0">
-                <a:solidFill>
-                  <a:schemeClr val="tx1"/>
-                </a:solidFill>
-              </a:rPr>
-              <a:t>Kupplung -</a:t>
-            </a:r>
-            <a:r>
-              <a:rPr lang="de-DE" sz="4000" dirty="0" smtClean="0">
-                <a:solidFill>
-                  <a:schemeClr val="tx1"/>
-                </a:solidFill>
-              </a:rPr>
-              <a:t/>
-            </a:r>
-            <a:br>
-              <a:rPr lang="de-DE" sz="4000" dirty="0" smtClean="0">
-                <a:solidFill>
-                  <a:schemeClr val="tx1"/>
-                </a:solidFill>
-              </a:rPr>
-            </a:br>
-            <a:r>
-              <a:rPr lang="de-DE" sz="600" dirty="0" err="1" smtClean="0">
-                <a:solidFill>
-                  <a:schemeClr val="tx1"/>
-                </a:solidFill>
-              </a:rPr>
-              <a:t>mrGearboxMogliCLUTCH</a:t>
-            </a:r>
-            <a:endParaRPr lang="en-US" sz="1200" dirty="0">
-              <a:solidFill>
-                <a:schemeClr val="tx1"/>
-              </a:solidFill>
-            </a:endParaRPr>
-          </a:p>
-        </p:txBody>
-      </p:sp>
-      <p:sp>
-        <p:nvSpPr>
-          <p:cNvPr id="24" name="Rectangle 23"/>
-          <p:cNvSpPr/>
-          <p:nvPr/>
-        </p:nvSpPr>
-        <p:spPr>
-          <a:xfrm>
-            <a:off x="6106786" y="4370554"/>
-            <a:ext cx="1332000" cy="432000"/>
+            <a:off x="5775627" y="4370554"/>
+            <a:ext cx="1188000" cy="432000"/>
           </a:xfrm>
           <a:prstGeom prst="rect">
             <a:avLst/>
@@ -4159,7 +4071,7 @@
                   <a:schemeClr val="tx1"/>
                 </a:solidFill>
               </a:rPr>
-              <a:t>Kupplung +</a:t>
+              <a:t>Kupplung</a:t>
             </a:r>
             <a:r>
               <a:rPr lang="de-DE" sz="4000" dirty="0" smtClean="0">
@@ -4194,6 +4106,102 @@
       </p:sp>
       <p:sp>
         <p:nvSpPr>
+          <p:cNvPr id="24" name="Rectangle 23"/>
+          <p:cNvSpPr/>
+          <p:nvPr/>
+        </p:nvSpPr>
+        <p:spPr>
+          <a:xfrm>
+            <a:off x="7038981" y="4370554"/>
+            <a:ext cx="1188000" cy="432000"/>
+          </a:xfrm>
+          <a:prstGeom prst="rect">
+            <a:avLst/>
+          </a:prstGeom>
+          <a:solidFill>
+            <a:srgbClr val="FFFFFF">
+              <a:alpha val="85000"/>
+            </a:srgbClr>
+          </a:solidFill>
+          <a:ln w="19050">
+            <a:solidFill>
+              <a:schemeClr val="accent6">
+                <a:lumMod val="60000"/>
+                <a:lumOff val="40000"/>
+              </a:schemeClr>
+            </a:solidFill>
+          </a:ln>
+        </p:spPr>
+        <p:style>
+          <a:lnRef idx="2">
+            <a:schemeClr val="accent1">
+              <a:shade val="50000"/>
+            </a:schemeClr>
+          </a:lnRef>
+          <a:fillRef idx="1">
+            <a:schemeClr val="accent1"/>
+          </a:fillRef>
+          <a:effectRef idx="0">
+            <a:schemeClr val="accent1"/>
+          </a:effectRef>
+          <a:fontRef idx="minor">
+            <a:schemeClr val="lt1"/>
+          </a:fontRef>
+        </p:style>
+        <p:txBody>
+          <a:bodyPr rtlCol="0" anchor="ctr"/>
+          <a:lstStyle/>
+          <a:p>
+            <a:pPr algn="ctr"/>
+            <a:r>
+              <a:rPr lang="de-DE" sz="1600" dirty="0" err="1" smtClean="0">
+                <a:solidFill>
+                  <a:schemeClr val="tx1"/>
+                </a:solidFill>
+              </a:rPr>
+              <a:t>Hud</a:t>
+            </a:r>
+            <a:r>
+              <a:rPr lang="de-DE" sz="1600" dirty="0" smtClean="0">
+                <a:solidFill>
+                  <a:schemeClr val="tx1"/>
+                </a:solidFill>
+              </a:rPr>
+              <a:t> an/aus</a:t>
+            </a:r>
+            <a:r>
+              <a:rPr lang="de-DE" sz="4000" dirty="0" smtClean="0">
+                <a:solidFill>
+                  <a:schemeClr val="tx1"/>
+                </a:solidFill>
+              </a:rPr>
+              <a:t/>
+            </a:r>
+            <a:br>
+              <a:rPr lang="de-DE" sz="4000" dirty="0" smtClean="0">
+                <a:solidFill>
+                  <a:schemeClr val="tx1"/>
+                </a:solidFill>
+              </a:rPr>
+            </a:br>
+            <a:r>
+              <a:rPr lang="de-DE" sz="600" dirty="0" err="1" smtClean="0">
+                <a:solidFill>
+                  <a:schemeClr val="tx1"/>
+                </a:solidFill>
+              </a:rPr>
+              <a:t>mrGearboxMogliCLUTCH</a:t>
+            </a:r>
+            <a:endParaRPr lang="en-US" sz="1200" dirty="0">
+              <a:solidFill>
+                <a:schemeClr val="tx1"/>
+              </a:solidFill>
+            </a:endParaRPr>
+          </a:p>
+        </p:txBody>
+      </p:sp>
+      <p:sp>
+        <p:nvSpPr>
           <p:cNvPr id="25" name="Rectangle 24"/>
           <p:cNvSpPr/>
           <p:nvPr/>
@@ -4201,7 +4209,7 @@
         <p:spPr>
           <a:xfrm>
             <a:off x="7033414" y="2748767"/>
-            <a:ext cx="1332000" cy="432000"/>
+            <a:ext cx="1188000" cy="432000"/>
           </a:xfrm>
           <a:prstGeom prst="rect">
             <a:avLst/>
@@ -4289,7 +4297,7 @@
         <p:spPr>
           <a:xfrm>
             <a:off x="7030336" y="3279239"/>
-            <a:ext cx="1332000" cy="432000"/>
+            <a:ext cx="1188000" cy="432000"/>
           </a:xfrm>
           <a:prstGeom prst="rect">
             <a:avLst/>
@@ -4376,8 +4384,8 @@
         </p:nvCxnSpPr>
         <p:spPr>
           <a:xfrm>
-            <a:off x="5596499" y="3248825"/>
-            <a:ext cx="534492" cy="362149"/>
+            <a:off x="5467173" y="3095005"/>
+            <a:ext cx="663818" cy="515969"/>
           </a:xfrm>
           <a:prstGeom prst="line">
             <a:avLst/>
@@ -4414,8 +4422,8 @@
         </p:nvCxnSpPr>
         <p:spPr>
           <a:xfrm>
-            <a:off x="5591984" y="2720851"/>
-            <a:ext cx="413961" cy="463963"/>
+            <a:off x="5462658" y="2567031"/>
+            <a:ext cx="543287" cy="617783"/>
           </a:xfrm>
           <a:prstGeom prst="line">
             <a:avLst/>
@@ -4454,9 +4462,9 @@
           <p:nvPr/>
         </p:nvCxnSpPr>
         <p:spPr>
-          <a:xfrm>
-            <a:off x="5502279" y="2348109"/>
-            <a:ext cx="468942" cy="225059"/>
+          <a:xfrm flipH="1">
+            <a:off x="5971221" y="2369881"/>
+            <a:ext cx="166630" cy="203287"/>
           </a:xfrm>
           <a:prstGeom prst="line">
             <a:avLst/>
@@ -4495,8 +4503,8 @@
         </p:nvCxnSpPr>
         <p:spPr>
           <a:xfrm flipH="1">
-            <a:off x="6384415" y="2348109"/>
-            <a:ext cx="587266" cy="225059"/>
+            <a:off x="7091987" y="2369881"/>
+            <a:ext cx="515266" cy="225059"/>
           </a:xfrm>
           <a:prstGeom prst="line">
             <a:avLst/>
@@ -4613,14 +4621,17 @@
         <p:spPr>
           <a:xfrm>
             <a:off x="6105458" y="4228389"/>
-            <a:ext cx="667328" cy="142165"/>
+            <a:ext cx="1527523" cy="142165"/>
           </a:xfrm>
           <a:prstGeom prst="line">
             <a:avLst/>
           </a:prstGeom>
           <a:ln w="19050">
             <a:solidFill>
-              <a:schemeClr val="accent6"/>
+              <a:schemeClr val="accent6">
+                <a:lumMod val="60000"/>
+                <a:lumOff val="40000"/>
+              </a:schemeClr>
             </a:solidFill>
           </a:ln>
         </p:spPr>
@@ -4649,19 +4660,16 @@
           <p:nvPr/>
         </p:nvCxnSpPr>
         <p:spPr>
-          <a:xfrm flipV="1">
-            <a:off x="5311752" y="4228389"/>
-            <a:ext cx="367145" cy="142165"/>
+          <a:xfrm flipH="1" flipV="1">
+            <a:off x="5678897" y="4228389"/>
+            <a:ext cx="690730" cy="142165"/>
           </a:xfrm>
           <a:prstGeom prst="line">
             <a:avLst/>
           </a:prstGeom>
           <a:ln w="19050">
             <a:solidFill>
-              <a:schemeClr val="accent6">
-                <a:lumMod val="40000"/>
-                <a:lumOff val="60000"/>
-              </a:schemeClr>
+              <a:schemeClr val="accent6"/>
             </a:solidFill>
           </a:ln>
         </p:spPr>
@@ -4690,9 +4698,9 @@
           <p:nvPr/>
         </p:nvCxnSpPr>
         <p:spPr>
-          <a:xfrm flipV="1">
-            <a:off x="5413773" y="3614394"/>
-            <a:ext cx="288393" cy="243965"/>
+          <a:xfrm>
+            <a:off x="5467173" y="3591087"/>
+            <a:ext cx="234993" cy="23307"/>
           </a:xfrm>
           <a:prstGeom prst="line">
             <a:avLst/>
@@ -5440,6 +5448,190 @@
           <a:ln w="19050">
             <a:solidFill>
               <a:schemeClr val="tx2"/>
+            </a:solidFill>
+          </a:ln>
+        </p:spPr>
+        <p:style>
+          <a:lnRef idx="1">
+            <a:schemeClr val="accent1"/>
+          </a:lnRef>
+          <a:fillRef idx="0">
+            <a:schemeClr val="accent1"/>
+          </a:fillRef>
+          <a:effectRef idx="0">
+            <a:schemeClr val="accent1"/>
+          </a:effectRef>
+          <a:fontRef idx="minor">
+            <a:schemeClr val="tx1"/>
+          </a:fontRef>
+        </p:style>
+      </p:cxnSp>
+      <p:sp>
+        <p:nvSpPr>
+          <p:cNvPr id="45" name="Rectangle 44"/>
+          <p:cNvSpPr/>
+          <p:nvPr/>
+        </p:nvSpPr>
+        <p:spPr>
+          <a:xfrm>
+            <a:off x="4511587" y="4369351"/>
+            <a:ext cx="1188000" cy="432000"/>
+          </a:xfrm>
+          <a:prstGeom prst="rect">
+            <a:avLst/>
+          </a:prstGeom>
+          <a:solidFill>
+            <a:srgbClr val="FFFFFF">
+              <a:alpha val="85000"/>
+            </a:srgbClr>
+          </a:solidFill>
+          <a:ln w="19050">
+            <a:solidFill>
+              <a:schemeClr val="accent6">
+                <a:lumMod val="50000"/>
+              </a:schemeClr>
+            </a:solidFill>
+          </a:ln>
+        </p:spPr>
+        <p:style>
+          <a:lnRef idx="2">
+            <a:schemeClr val="accent1">
+              <a:shade val="50000"/>
+            </a:schemeClr>
+          </a:lnRef>
+          <a:fillRef idx="1">
+            <a:schemeClr val="accent1"/>
+          </a:fillRef>
+          <a:effectRef idx="0">
+            <a:schemeClr val="accent1"/>
+          </a:effectRef>
+          <a:fontRef idx="minor">
+            <a:schemeClr val="lt1"/>
+          </a:fontRef>
+        </p:style>
+        <p:txBody>
+          <a:bodyPr rtlCol="0" anchor="ctr"/>
+          <a:lstStyle/>
+          <a:p>
+            <a:pPr algn="ctr"/>
+            <a:r>
+              <a:rPr lang="de-DE" sz="1600" dirty="0" smtClean="0">
+                <a:solidFill>
+                  <a:schemeClr val="tx1"/>
+                </a:solidFill>
+              </a:rPr>
+              <a:t>All Auto</a:t>
+            </a:r>
+            <a:r>
+              <a:rPr lang="de-DE" sz="4000" dirty="0" smtClean="0">
+                <a:solidFill>
+                  <a:schemeClr val="tx1"/>
+                </a:solidFill>
+              </a:rPr>
+              <a:t/>
+            </a:r>
+            <a:br>
+              <a:rPr lang="de-DE" sz="4000" dirty="0" smtClean="0">
+                <a:solidFill>
+                  <a:schemeClr val="tx1"/>
+                </a:solidFill>
+              </a:rPr>
+            </a:br>
+            <a:r>
+              <a:rPr lang="de-DE" sz="600" dirty="0" err="1" smtClean="0">
+                <a:solidFill>
+                  <a:schemeClr val="tx1"/>
+                </a:solidFill>
+              </a:rPr>
+              <a:t>mrGearboxMogliCLUTCH</a:t>
+            </a:r>
+            <a:endParaRPr lang="en-US" sz="1200" dirty="0">
+              <a:solidFill>
+                <a:schemeClr val="tx1"/>
+              </a:solidFill>
+            </a:endParaRPr>
+          </a:p>
+        </p:txBody>
+      </p:sp>
+      <p:sp>
+        <p:nvSpPr>
+          <p:cNvPr id="48" name="Rectangle 47"/>
+          <p:cNvSpPr/>
+          <p:nvPr/>
+        </p:nvSpPr>
+        <p:spPr>
+          <a:xfrm>
+            <a:off x="5072677" y="3864706"/>
+            <a:ext cx="363682" cy="363683"/>
+          </a:xfrm>
+          <a:prstGeom prst="rect">
+            <a:avLst/>
+          </a:prstGeom>
+          <a:noFill/>
+          <a:ln w="19050">
+            <a:solidFill>
+              <a:schemeClr val="accent6">
+                <a:lumMod val="50000"/>
+              </a:schemeClr>
+            </a:solidFill>
+          </a:ln>
+        </p:spPr>
+        <p:style>
+          <a:lnRef idx="2">
+            <a:schemeClr val="accent1">
+              <a:shade val="50000"/>
+            </a:schemeClr>
+          </a:lnRef>
+          <a:fillRef idx="1">
+            <a:schemeClr val="accent1"/>
+          </a:fillRef>
+          <a:effectRef idx="0">
+            <a:schemeClr val="accent1"/>
+          </a:effectRef>
+          <a:fontRef idx="minor">
+            <a:schemeClr val="lt1"/>
+          </a:fontRef>
+        </p:style>
+        <p:txBody>
+          <a:bodyPr rot="0" spcFirstLastPara="0" vertOverflow="overflow" horzOverflow="overflow" vert="horz" wrap="square" lIns="91440" tIns="45720" rIns="91440" bIns="45720" numCol="1" spcCol="0" rtlCol="0" fromWordArt="0" anchor="ctr" anchorCtr="0" forceAA="0" compatLnSpc="1">
+            <a:prstTxWarp prst="textNoShape">
+              <a:avLst/>
+            </a:prstTxWarp>
+            <a:noAutofit/>
+          </a:bodyPr>
+          <a:lstStyle/>
+          <a:p>
+            <a:pPr algn="ctr"/>
+            <a:endParaRPr lang="en-US" sz="1600" dirty="0" smtClean="0">
+              <a:solidFill>
+                <a:schemeClr val="tx1"/>
+              </a:solidFill>
+            </a:endParaRPr>
+          </a:p>
+        </p:txBody>
+      </p:sp>
+      <p:cxnSp>
+        <p:nvCxnSpPr>
+          <p:cNvPr id="49" name="Straight Connector 48"/>
+          <p:cNvCxnSpPr>
+            <a:stCxn id="45" idx="0"/>
+            <a:endCxn id="48" idx="2"/>
+          </p:cNvCxnSpPr>
+          <p:nvPr/>
+        </p:nvCxnSpPr>
+        <p:spPr>
+          <a:xfrm flipV="1">
+            <a:off x="5105587" y="4228389"/>
+            <a:ext cx="148931" cy="140962"/>
+          </a:xfrm>
+          <a:prstGeom prst="line">
+            <a:avLst/>
+          </a:prstGeom>
+          <a:ln w="19050">
+            <a:solidFill>
+              <a:schemeClr val="accent6">
+                <a:lumMod val="50000"/>
+              </a:schemeClr>
             </a:solidFill>
           </a:ln>
         </p:spPr>
@@ -5520,93 +5712,6 @@
       </p:pic>
       <p:sp>
         <p:nvSpPr>
-          <p:cNvPr id="27" name="Rectangle 26"/>
-          <p:cNvSpPr/>
-          <p:nvPr/>
-        </p:nvSpPr>
-        <p:spPr>
-          <a:xfrm>
-            <a:off x="2798128" y="4290646"/>
-            <a:ext cx="2934457" cy="375139"/>
-          </a:xfrm>
-          <a:prstGeom prst="rect">
-            <a:avLst/>
-          </a:prstGeom>
-          <a:solidFill>
-            <a:schemeClr val="bg1">
-              <a:alpha val="85000"/>
-            </a:schemeClr>
-          </a:solidFill>
-          <a:ln w="19050">
-            <a:solidFill>
-              <a:schemeClr val="bg1">
-                <a:lumMod val="65000"/>
-              </a:schemeClr>
-            </a:solidFill>
-          </a:ln>
-        </p:spPr>
-        <p:style>
-          <a:lnRef idx="2">
-            <a:schemeClr val="accent1">
-              <a:shade val="50000"/>
-            </a:schemeClr>
-          </a:lnRef>
-          <a:fillRef idx="1">
-            <a:schemeClr val="accent1"/>
-          </a:fillRef>
-          <a:effectRef idx="0">
-            <a:schemeClr val="accent1"/>
-          </a:effectRef>
-          <a:fontRef idx="minor">
-            <a:schemeClr val="lt1"/>
-          </a:fontRef>
-        </p:style>
-        <p:txBody>
-          <a:bodyPr lIns="90000" rtlCol="0" anchor="ctr"/>
-          <a:lstStyle/>
-          <a:p>
-            <a:pPr algn="ctr"/>
-            <a:r>
-              <a:rPr lang="de-DE" sz="1600" dirty="0" smtClean="0">
-                <a:solidFill>
-                  <a:schemeClr val="tx1"/>
-                </a:solidFill>
-              </a:rPr>
-              <a:t>Kupplung automatisch/manuell</a:t>
-            </a:r>
-            <a:r>
-              <a:rPr lang="de-DE" sz="4000" dirty="0" smtClean="0">
-                <a:solidFill>
-                  <a:schemeClr val="tx1"/>
-                </a:solidFill>
-              </a:rPr>
-              <a:t/>
-            </a:r>
-            <a:br>
-              <a:rPr lang="de-DE" sz="4000" dirty="0" smtClean="0">
-                <a:solidFill>
-                  <a:schemeClr val="tx1"/>
-                </a:solidFill>
-              </a:rPr>
-            </a:br>
-            <a:r>
-              <a:rPr lang="de-DE" sz="600" dirty="0" err="1" smtClean="0">
-                <a:solidFill>
-                  <a:schemeClr val="tx1"/>
-                </a:solidFill>
-              </a:rPr>
-              <a:t>mrGearboxMogliAUTOCLUTCH</a:t>
-            </a:r>
-            <a:endParaRPr lang="en-US" sz="1600" dirty="0">
-              <a:solidFill>
-                <a:schemeClr val="tx1"/>
-              </a:solidFill>
-            </a:endParaRPr>
-          </a:p>
-        </p:txBody>
-      </p:sp>
-      <p:sp>
-        <p:nvSpPr>
           <p:cNvPr id="12" name="Rectangle 11"/>
           <p:cNvSpPr/>
           <p:nvPr/>
@@ -5867,7 +5972,7 @@
         <p:spPr>
           <a:xfrm>
             <a:off x="7033414" y="2748767"/>
-            <a:ext cx="1332000" cy="432000"/>
+            <a:ext cx="1188000" cy="432000"/>
           </a:xfrm>
           <a:prstGeom prst="rect">
             <a:avLst/>
@@ -5955,7 +6060,7 @@
         <p:spPr>
           <a:xfrm>
             <a:off x="7030336" y="3279239"/>
-            <a:ext cx="1332000" cy="432000"/>
+            <a:ext cx="1188000" cy="432000"/>
           </a:xfrm>
           <a:prstGeom prst="rect">
             <a:avLst/>
@@ -6948,6 +7053,287 @@
           <a:ln w="19050">
             <a:solidFill>
               <a:schemeClr val="tx2"/>
+            </a:solidFill>
+          </a:ln>
+        </p:spPr>
+        <p:style>
+          <a:lnRef idx="1">
+            <a:schemeClr val="accent1"/>
+          </a:lnRef>
+          <a:fillRef idx="0">
+            <a:schemeClr val="accent1"/>
+          </a:fillRef>
+          <a:effectRef idx="0">
+            <a:schemeClr val="accent1"/>
+          </a:effectRef>
+          <a:fontRef idx="minor">
+            <a:schemeClr val="tx1"/>
+          </a:fontRef>
+        </p:style>
+      </p:cxnSp>
+      <p:sp>
+        <p:nvSpPr>
+          <p:cNvPr id="36" name="Rectangle 35"/>
+          <p:cNvSpPr/>
+          <p:nvPr/>
+        </p:nvSpPr>
+        <p:spPr>
+          <a:xfrm>
+            <a:off x="2798129" y="4290646"/>
+            <a:ext cx="1603495" cy="375139"/>
+          </a:xfrm>
+          <a:prstGeom prst="rect">
+            <a:avLst/>
+          </a:prstGeom>
+          <a:solidFill>
+            <a:schemeClr val="bg1">
+              <a:alpha val="85000"/>
+            </a:schemeClr>
+          </a:solidFill>
+          <a:ln w="19050">
+            <a:solidFill>
+              <a:schemeClr val="bg1">
+                <a:lumMod val="65000"/>
+              </a:schemeClr>
+            </a:solidFill>
+          </a:ln>
+        </p:spPr>
+        <p:style>
+          <a:lnRef idx="2">
+            <a:schemeClr val="accent1">
+              <a:shade val="50000"/>
+            </a:schemeClr>
+          </a:lnRef>
+          <a:fillRef idx="1">
+            <a:schemeClr val="accent1"/>
+          </a:fillRef>
+          <a:effectRef idx="0">
+            <a:schemeClr val="accent1"/>
+          </a:effectRef>
+          <a:fontRef idx="minor">
+            <a:schemeClr val="lt1"/>
+          </a:fontRef>
+        </p:style>
+        <p:txBody>
+          <a:bodyPr lIns="90000" rtlCol="0" anchor="ctr"/>
+          <a:lstStyle/>
+          <a:p>
+            <a:pPr algn="ctr"/>
+            <a:r>
+              <a:rPr lang="de-DE" sz="1600" dirty="0" smtClean="0">
+                <a:solidFill>
+                  <a:schemeClr val="tx1"/>
+                </a:solidFill>
+              </a:rPr>
+              <a:t>ECO Modus</a:t>
+            </a:r>
+            <a:r>
+              <a:rPr lang="de-DE" sz="4000" dirty="0" smtClean="0">
+                <a:solidFill>
+                  <a:schemeClr val="tx1"/>
+                </a:solidFill>
+              </a:rPr>
+              <a:t/>
+            </a:r>
+            <a:br>
+              <a:rPr lang="de-DE" sz="4000" dirty="0" smtClean="0">
+                <a:solidFill>
+                  <a:schemeClr val="tx1"/>
+                </a:solidFill>
+              </a:rPr>
+            </a:br>
+            <a:r>
+              <a:rPr lang="de-DE" sz="600" dirty="0" err="1" smtClean="0">
+                <a:solidFill>
+                  <a:schemeClr val="tx1"/>
+                </a:solidFill>
+              </a:rPr>
+              <a:t>mrGearboxMogliREVERSE</a:t>
+            </a:r>
+            <a:endParaRPr lang="en-US" sz="1600" dirty="0">
+              <a:solidFill>
+                <a:schemeClr val="tx1"/>
+              </a:solidFill>
+            </a:endParaRPr>
+          </a:p>
+        </p:txBody>
+      </p:sp>
+      <p:sp>
+        <p:nvSpPr>
+          <p:cNvPr id="37" name="Rectangle 36"/>
+          <p:cNvSpPr/>
+          <p:nvPr/>
+        </p:nvSpPr>
+        <p:spPr>
+          <a:xfrm>
+            <a:off x="5497056" y="3864706"/>
+            <a:ext cx="363682" cy="363683"/>
+          </a:xfrm>
+          <a:prstGeom prst="rect">
+            <a:avLst/>
+          </a:prstGeom>
+          <a:noFill/>
+          <a:ln w="19050">
+            <a:solidFill>
+              <a:schemeClr val="accent6"/>
+            </a:solidFill>
+          </a:ln>
+        </p:spPr>
+        <p:style>
+          <a:lnRef idx="2">
+            <a:schemeClr val="accent1">
+              <a:shade val="50000"/>
+            </a:schemeClr>
+          </a:lnRef>
+          <a:fillRef idx="1">
+            <a:schemeClr val="accent1"/>
+          </a:fillRef>
+          <a:effectRef idx="0">
+            <a:schemeClr val="accent1"/>
+          </a:effectRef>
+          <a:fontRef idx="minor">
+            <a:schemeClr val="lt1"/>
+          </a:fontRef>
+        </p:style>
+        <p:txBody>
+          <a:bodyPr rot="0" spcFirstLastPara="0" vertOverflow="overflow" horzOverflow="overflow" vert="horz" wrap="square" lIns="91440" tIns="45720" rIns="91440" bIns="45720" numCol="1" spcCol="0" rtlCol="0" fromWordArt="0" anchor="ctr" anchorCtr="0" forceAA="0" compatLnSpc="1">
+            <a:prstTxWarp prst="textNoShape">
+              <a:avLst/>
+            </a:prstTxWarp>
+            <a:noAutofit/>
+          </a:bodyPr>
+          <a:lstStyle/>
+          <a:p>
+            <a:pPr algn="ctr"/>
+            <a:endParaRPr lang="en-US" sz="1600" dirty="0" smtClean="0">
+              <a:solidFill>
+                <a:schemeClr val="tx1"/>
+              </a:solidFill>
+            </a:endParaRPr>
+          </a:p>
+        </p:txBody>
+      </p:sp>
+      <p:sp>
+        <p:nvSpPr>
+          <p:cNvPr id="38" name="Rectangle 37"/>
+          <p:cNvSpPr/>
+          <p:nvPr/>
+        </p:nvSpPr>
+        <p:spPr>
+          <a:xfrm>
+            <a:off x="4593771" y="4370554"/>
+            <a:ext cx="2369856" cy="432000"/>
+          </a:xfrm>
+          <a:prstGeom prst="rect">
+            <a:avLst/>
+          </a:prstGeom>
+          <a:solidFill>
+            <a:srgbClr val="FFFFFF">
+              <a:alpha val="85000"/>
+            </a:srgbClr>
+          </a:solidFill>
+          <a:ln w="19050">
+            <a:solidFill>
+              <a:schemeClr val="accent6"/>
+            </a:solidFill>
+          </a:ln>
+        </p:spPr>
+        <p:style>
+          <a:lnRef idx="2">
+            <a:schemeClr val="accent1">
+              <a:shade val="50000"/>
+            </a:schemeClr>
+          </a:lnRef>
+          <a:fillRef idx="1">
+            <a:schemeClr val="accent1"/>
+          </a:fillRef>
+          <a:effectRef idx="0">
+            <a:schemeClr val="accent1"/>
+          </a:effectRef>
+          <a:fontRef idx="minor">
+            <a:schemeClr val="lt1"/>
+          </a:fontRef>
+        </p:style>
+        <p:txBody>
+          <a:bodyPr rtlCol="0" anchor="ctr"/>
+          <a:lstStyle/>
+          <a:p>
+            <a:pPr algn="ctr"/>
+            <a:r>
+              <a:rPr lang="de-DE" sz="1600" dirty="0" smtClean="0">
+                <a:solidFill>
+                  <a:schemeClr val="tx1"/>
+                </a:solidFill>
+              </a:rPr>
+              <a:t>Kupplung </a:t>
+            </a:r>
+            <a:r>
+              <a:rPr lang="de-DE" sz="1600" dirty="0" err="1" smtClean="0">
+                <a:solidFill>
+                  <a:schemeClr val="tx1"/>
+                </a:solidFill>
+              </a:rPr>
+              <a:t>auto</a:t>
+            </a:r>
+            <a:r>
+              <a:rPr lang="de-DE" sz="1600" dirty="0" smtClean="0">
+                <a:solidFill>
+                  <a:schemeClr val="tx1"/>
+                </a:solidFill>
+              </a:rPr>
+              <a:t>./manuell</a:t>
+            </a:r>
+            <a:r>
+              <a:rPr lang="de-DE" sz="4000" dirty="0" smtClean="0">
+                <a:solidFill>
+                  <a:schemeClr val="tx1"/>
+                </a:solidFill>
+              </a:rPr>
+              <a:t/>
+            </a:r>
+            <a:br>
+              <a:rPr lang="de-DE" sz="4000" dirty="0" smtClean="0">
+                <a:solidFill>
+                  <a:schemeClr val="tx1"/>
+                </a:solidFill>
+              </a:rPr>
+            </a:br>
+            <a:r>
+              <a:rPr lang="de-DE" sz="600" dirty="0" err="1" smtClean="0">
+                <a:solidFill>
+                  <a:schemeClr val="tx1"/>
+                </a:solidFill>
+              </a:rPr>
+              <a:t>mrGearboxMogliCLUTCH</a:t>
+            </a:r>
+            <a:endParaRPr lang="en-US" sz="1200" dirty="0">
+              <a:solidFill>
+                <a:schemeClr val="tx1"/>
+              </a:solidFill>
+            </a:endParaRPr>
+          </a:p>
+        </p:txBody>
+      </p:sp>
+      <p:cxnSp>
+        <p:nvCxnSpPr>
+          <p:cNvPr id="41" name="Straight Connector 40"/>
+          <p:cNvCxnSpPr>
+            <a:stCxn id="38" idx="0"/>
+            <a:endCxn id="37" idx="2"/>
+          </p:cNvCxnSpPr>
+          <p:nvPr/>
+        </p:nvCxnSpPr>
+        <p:spPr>
+          <a:xfrm flipH="1" flipV="1">
+            <a:off x="5678897" y="4228389"/>
+            <a:ext cx="99802" cy="142165"/>
+          </a:xfrm>
+          <a:prstGeom prst="line">
+            <a:avLst/>
+          </a:prstGeom>
+          <a:ln w="19050">
+            <a:solidFill>
+              <a:schemeClr val="accent6"/>
             </a:solidFill>
           </a:ln>
         </p:spPr>
@@ -7240,15 +7626,7 @@
                   <a:schemeClr val="tx1"/>
                 </a:solidFill>
               </a:rPr>
-              <a:t>. </a:t>
-            </a:r>
-            <a:r>
-              <a:rPr lang="de-DE" sz="1600" dirty="0" smtClean="0">
-                <a:solidFill>
-                  <a:schemeClr val="tx1"/>
-                </a:solidFill>
-              </a:rPr>
-              <a:t>+</a:t>
+              <a:t>. +</a:t>
             </a:r>
             <a:r>
               <a:rPr lang="de-DE" sz="4000" dirty="0" smtClean="0">
@@ -7827,15 +8205,7 @@
                   <a:schemeClr val="tx1"/>
                 </a:solidFill>
               </a:rPr>
-              <a:t> </a:t>
-            </a:r>
-            <a:r>
-              <a:rPr lang="de-DE" sz="1600" dirty="0" smtClean="0">
-                <a:solidFill>
-                  <a:schemeClr val="tx1"/>
-                </a:solidFill>
-              </a:rPr>
-              <a:t>+</a:t>
+              <a:t> +</a:t>
             </a:r>
             <a:r>
               <a:rPr lang="de-DE" sz="4000" dirty="0" smtClean="0">
@@ -7936,15 +8306,7 @@
                   <a:schemeClr val="tx1"/>
                 </a:solidFill>
               </a:rPr>
-              <a:t> </a:t>
-            </a:r>
-            <a:r>
-              <a:rPr lang="de-DE" sz="1600" dirty="0" smtClean="0">
-                <a:solidFill>
-                  <a:schemeClr val="tx1"/>
-                </a:solidFill>
-              </a:rPr>
-              <a:t>-</a:t>
+              <a:t> -</a:t>
             </a:r>
             <a:r>
               <a:rPr lang="de-DE" sz="4000" dirty="0" smtClean="0">

</xml_diff>

<commit_message>
Version number on store picture
</commit_message>
<xml_diff>
--- a/Documentation/Tastatur.pptx
+++ b/Documentation/Tastatur.pptx
@@ -8,6 +8,7 @@
     <p:sldId id="256" r:id="rId2"/>
     <p:sldId id="257" r:id="rId3"/>
     <p:sldId id="258" r:id="rId4"/>
+    <p:sldId id="259" r:id="rId5"/>
   </p:sldIdLst>
   <p:sldSz cx="12192000" cy="6858000"/>
   <p:notesSz cx="6858000" cy="9144000"/>
@@ -245,7 +246,7 @@
           <a:p>
             <a:fld id="{A5E903F8-D08C-420F-92B0-BC9B547C8ADE}" type="datetimeFigureOut">
               <a:rPr lang="en-US" smtClean="0"/>
-              <a:t>9/24/2015</a:t>
+              <a:t>1/16/2017</a:t>
             </a:fld>
             <a:endParaRPr lang="en-US"/>
           </a:p>
@@ -415,7 +416,7 @@
           <a:p>
             <a:fld id="{A5E903F8-D08C-420F-92B0-BC9B547C8ADE}" type="datetimeFigureOut">
               <a:rPr lang="en-US" smtClean="0"/>
-              <a:t>9/24/2015</a:t>
+              <a:t>1/16/2017</a:t>
             </a:fld>
             <a:endParaRPr lang="en-US"/>
           </a:p>
@@ -595,7 +596,7 @@
           <a:p>
             <a:fld id="{A5E903F8-D08C-420F-92B0-BC9B547C8ADE}" type="datetimeFigureOut">
               <a:rPr lang="en-US" smtClean="0"/>
-              <a:t>9/24/2015</a:t>
+              <a:t>1/16/2017</a:t>
             </a:fld>
             <a:endParaRPr lang="en-US"/>
           </a:p>
@@ -765,7 +766,7 @@
           <a:p>
             <a:fld id="{A5E903F8-D08C-420F-92B0-BC9B547C8ADE}" type="datetimeFigureOut">
               <a:rPr lang="en-US" smtClean="0"/>
-              <a:t>9/24/2015</a:t>
+              <a:t>1/16/2017</a:t>
             </a:fld>
             <a:endParaRPr lang="en-US"/>
           </a:p>
@@ -1011,7 +1012,7 @@
           <a:p>
             <a:fld id="{A5E903F8-D08C-420F-92B0-BC9B547C8ADE}" type="datetimeFigureOut">
               <a:rPr lang="en-US" smtClean="0"/>
-              <a:t>9/24/2015</a:t>
+              <a:t>1/16/2017</a:t>
             </a:fld>
             <a:endParaRPr lang="en-US"/>
           </a:p>
@@ -1243,7 +1244,7 @@
           <a:p>
             <a:fld id="{A5E903F8-D08C-420F-92B0-BC9B547C8ADE}" type="datetimeFigureOut">
               <a:rPr lang="en-US" smtClean="0"/>
-              <a:t>9/24/2015</a:t>
+              <a:t>1/16/2017</a:t>
             </a:fld>
             <a:endParaRPr lang="en-US"/>
           </a:p>
@@ -1610,7 +1611,7 @@
           <a:p>
             <a:fld id="{A5E903F8-D08C-420F-92B0-BC9B547C8ADE}" type="datetimeFigureOut">
               <a:rPr lang="en-US" smtClean="0"/>
-              <a:t>9/24/2015</a:t>
+              <a:t>1/16/2017</a:t>
             </a:fld>
             <a:endParaRPr lang="en-US"/>
           </a:p>
@@ -1728,7 +1729,7 @@
           <a:p>
             <a:fld id="{A5E903F8-D08C-420F-92B0-BC9B547C8ADE}" type="datetimeFigureOut">
               <a:rPr lang="en-US" smtClean="0"/>
-              <a:t>9/24/2015</a:t>
+              <a:t>1/16/2017</a:t>
             </a:fld>
             <a:endParaRPr lang="en-US"/>
           </a:p>
@@ -1823,7 +1824,7 @@
           <a:p>
             <a:fld id="{A5E903F8-D08C-420F-92B0-BC9B547C8ADE}" type="datetimeFigureOut">
               <a:rPr lang="en-US" smtClean="0"/>
-              <a:t>9/24/2015</a:t>
+              <a:t>1/16/2017</a:t>
             </a:fld>
             <a:endParaRPr lang="en-US"/>
           </a:p>
@@ -2100,7 +2101,7 @@
           <a:p>
             <a:fld id="{A5E903F8-D08C-420F-92B0-BC9B547C8ADE}" type="datetimeFigureOut">
               <a:rPr lang="en-US" smtClean="0"/>
-              <a:t>9/24/2015</a:t>
+              <a:t>1/16/2017</a:t>
             </a:fld>
             <a:endParaRPr lang="en-US"/>
           </a:p>
@@ -2353,7 +2354,7 @@
           <a:p>
             <a:fld id="{A5E903F8-D08C-420F-92B0-BC9B547C8ADE}" type="datetimeFigureOut">
               <a:rPr lang="en-US" smtClean="0"/>
-              <a:t>9/24/2015</a:t>
+              <a:t>1/16/2017</a:t>
             </a:fld>
             <a:endParaRPr lang="en-US"/>
           </a:p>
@@ -2566,7 +2567,7 @@
           <a:p>
             <a:fld id="{A5E903F8-D08C-420F-92B0-BC9B547C8ADE}" type="datetimeFigureOut">
               <a:rPr lang="en-US" smtClean="0"/>
-              <a:t>9/24/2015</a:t>
+              <a:t>1/16/2017</a:t>
             </a:fld>
             <a:endParaRPr lang="en-US"/>
           </a:p>
@@ -5466,190 +5467,6 @@
           </a:fontRef>
         </p:style>
       </p:cxnSp>
-      <p:sp>
-        <p:nvSpPr>
-          <p:cNvPr id="45" name="Rectangle 44"/>
-          <p:cNvSpPr/>
-          <p:nvPr/>
-        </p:nvSpPr>
-        <p:spPr>
-          <a:xfrm>
-            <a:off x="4511587" y="4369351"/>
-            <a:ext cx="1188000" cy="432000"/>
-          </a:xfrm>
-          <a:prstGeom prst="rect">
-            <a:avLst/>
-          </a:prstGeom>
-          <a:solidFill>
-            <a:srgbClr val="FFFFFF">
-              <a:alpha val="85000"/>
-            </a:srgbClr>
-          </a:solidFill>
-          <a:ln w="19050">
-            <a:solidFill>
-              <a:schemeClr val="accent6">
-                <a:lumMod val="50000"/>
-              </a:schemeClr>
-            </a:solidFill>
-          </a:ln>
-        </p:spPr>
-        <p:style>
-          <a:lnRef idx="2">
-            <a:schemeClr val="accent1">
-              <a:shade val="50000"/>
-            </a:schemeClr>
-          </a:lnRef>
-          <a:fillRef idx="1">
-            <a:schemeClr val="accent1"/>
-          </a:fillRef>
-          <a:effectRef idx="0">
-            <a:schemeClr val="accent1"/>
-          </a:effectRef>
-          <a:fontRef idx="minor">
-            <a:schemeClr val="lt1"/>
-          </a:fontRef>
-        </p:style>
-        <p:txBody>
-          <a:bodyPr rtlCol="0" anchor="ctr"/>
-          <a:lstStyle/>
-          <a:p>
-            <a:pPr algn="ctr"/>
-            <a:r>
-              <a:rPr lang="de-DE" sz="1600" dirty="0" smtClean="0">
-                <a:solidFill>
-                  <a:schemeClr val="tx1"/>
-                </a:solidFill>
-              </a:rPr>
-              <a:t>All Auto</a:t>
-            </a:r>
-            <a:r>
-              <a:rPr lang="de-DE" sz="4000" dirty="0" smtClean="0">
-                <a:solidFill>
-                  <a:schemeClr val="tx1"/>
-                </a:solidFill>
-              </a:rPr>
-              <a:t/>
-            </a:r>
-            <a:br>
-              <a:rPr lang="de-DE" sz="4000" dirty="0" smtClean="0">
-                <a:solidFill>
-                  <a:schemeClr val="tx1"/>
-                </a:solidFill>
-              </a:rPr>
-            </a:br>
-            <a:r>
-              <a:rPr lang="de-DE" sz="600" dirty="0" err="1" smtClean="0">
-                <a:solidFill>
-                  <a:schemeClr val="tx1"/>
-                </a:solidFill>
-              </a:rPr>
-              <a:t>mrGearboxMogliCLUTCH</a:t>
-            </a:r>
-            <a:endParaRPr lang="en-US" sz="1200" dirty="0">
-              <a:solidFill>
-                <a:schemeClr val="tx1"/>
-              </a:solidFill>
-            </a:endParaRPr>
-          </a:p>
-        </p:txBody>
-      </p:sp>
-      <p:sp>
-        <p:nvSpPr>
-          <p:cNvPr id="48" name="Rectangle 47"/>
-          <p:cNvSpPr/>
-          <p:nvPr/>
-        </p:nvSpPr>
-        <p:spPr>
-          <a:xfrm>
-            <a:off x="5072677" y="3864706"/>
-            <a:ext cx="363682" cy="363683"/>
-          </a:xfrm>
-          <a:prstGeom prst="rect">
-            <a:avLst/>
-          </a:prstGeom>
-          <a:noFill/>
-          <a:ln w="19050">
-            <a:solidFill>
-              <a:schemeClr val="accent6">
-                <a:lumMod val="50000"/>
-              </a:schemeClr>
-            </a:solidFill>
-          </a:ln>
-        </p:spPr>
-        <p:style>
-          <a:lnRef idx="2">
-            <a:schemeClr val="accent1">
-              <a:shade val="50000"/>
-            </a:schemeClr>
-          </a:lnRef>
-          <a:fillRef idx="1">
-            <a:schemeClr val="accent1"/>
-          </a:fillRef>
-          <a:effectRef idx="0">
-            <a:schemeClr val="accent1"/>
-          </a:effectRef>
-          <a:fontRef idx="minor">
-            <a:schemeClr val="lt1"/>
-          </a:fontRef>
-        </p:style>
-        <p:txBody>
-          <a:bodyPr rot="0" spcFirstLastPara="0" vertOverflow="overflow" horzOverflow="overflow" vert="horz" wrap="square" lIns="91440" tIns="45720" rIns="91440" bIns="45720" numCol="1" spcCol="0" rtlCol="0" fromWordArt="0" anchor="ctr" anchorCtr="0" forceAA="0" compatLnSpc="1">
-            <a:prstTxWarp prst="textNoShape">
-              <a:avLst/>
-            </a:prstTxWarp>
-            <a:noAutofit/>
-          </a:bodyPr>
-          <a:lstStyle/>
-          <a:p>
-            <a:pPr algn="ctr"/>
-            <a:endParaRPr lang="en-US" sz="1600" dirty="0" smtClean="0">
-              <a:solidFill>
-                <a:schemeClr val="tx1"/>
-              </a:solidFill>
-            </a:endParaRPr>
-          </a:p>
-        </p:txBody>
-      </p:sp>
-      <p:cxnSp>
-        <p:nvCxnSpPr>
-          <p:cNvPr id="49" name="Straight Connector 48"/>
-          <p:cNvCxnSpPr>
-            <a:stCxn id="45" idx="0"/>
-            <a:endCxn id="48" idx="2"/>
-          </p:cNvCxnSpPr>
-          <p:nvPr/>
-        </p:nvCxnSpPr>
-        <p:spPr>
-          <a:xfrm flipV="1">
-            <a:off x="5105587" y="4228389"/>
-            <a:ext cx="148931" cy="140962"/>
-          </a:xfrm>
-          <a:prstGeom prst="line">
-            <a:avLst/>
-          </a:prstGeom>
-          <a:ln w="19050">
-            <a:solidFill>
-              <a:schemeClr val="accent6">
-                <a:lumMod val="50000"/>
-              </a:schemeClr>
-            </a:solidFill>
-          </a:ln>
-        </p:spPr>
-        <p:style>
-          <a:lnRef idx="1">
-            <a:schemeClr val="accent1"/>
-          </a:lnRef>
-          <a:fillRef idx="0">
-            <a:schemeClr val="accent1"/>
-          </a:fillRef>
-          <a:effectRef idx="0">
-            <a:schemeClr val="accent1"/>
-          </a:effectRef>
-          <a:fontRef idx="minor">
-            <a:schemeClr val="tx1"/>
-          </a:fontRef>
-        </p:style>
-      </p:cxnSp>
     </p:spTree>
     <p:extLst>
       <p:ext uri="{BB962C8B-B14F-4D97-AF65-F5344CB8AC3E}">
@@ -7334,6 +7151,193 @@
           <a:ln w="19050">
             <a:solidFill>
               <a:schemeClr val="accent6"/>
+            </a:solidFill>
+          </a:ln>
+        </p:spPr>
+        <p:style>
+          <a:lnRef idx="1">
+            <a:schemeClr val="accent1"/>
+          </a:lnRef>
+          <a:fillRef idx="0">
+            <a:schemeClr val="accent1"/>
+          </a:fillRef>
+          <a:effectRef idx="0">
+            <a:schemeClr val="accent1"/>
+          </a:effectRef>
+          <a:fontRef idx="minor">
+            <a:schemeClr val="tx1"/>
+          </a:fontRef>
+        </p:style>
+      </p:cxnSp>
+      <p:sp>
+        <p:nvSpPr>
+          <p:cNvPr id="42" name="Rectangle 41"/>
+          <p:cNvSpPr/>
+          <p:nvPr/>
+        </p:nvSpPr>
+        <p:spPr>
+          <a:xfrm>
+            <a:off x="5923617" y="3864706"/>
+            <a:ext cx="363682" cy="363683"/>
+          </a:xfrm>
+          <a:prstGeom prst="rect">
+            <a:avLst/>
+          </a:prstGeom>
+          <a:noFill/>
+          <a:ln w="19050">
+            <a:solidFill>
+              <a:schemeClr val="accent6">
+                <a:lumMod val="60000"/>
+                <a:lumOff val="40000"/>
+              </a:schemeClr>
+            </a:solidFill>
+          </a:ln>
+        </p:spPr>
+        <p:style>
+          <a:lnRef idx="2">
+            <a:schemeClr val="accent1">
+              <a:shade val="50000"/>
+            </a:schemeClr>
+          </a:lnRef>
+          <a:fillRef idx="1">
+            <a:schemeClr val="accent1"/>
+          </a:fillRef>
+          <a:effectRef idx="0">
+            <a:schemeClr val="accent1"/>
+          </a:effectRef>
+          <a:fontRef idx="minor">
+            <a:schemeClr val="lt1"/>
+          </a:fontRef>
+        </p:style>
+        <p:txBody>
+          <a:bodyPr rot="0" spcFirstLastPara="0" vertOverflow="overflow" horzOverflow="overflow" vert="horz" wrap="square" lIns="91440" tIns="45720" rIns="91440" bIns="45720" numCol="1" spcCol="0" rtlCol="0" fromWordArt="0" anchor="ctr" anchorCtr="0" forceAA="0" compatLnSpc="1">
+            <a:prstTxWarp prst="textNoShape">
+              <a:avLst/>
+            </a:prstTxWarp>
+            <a:noAutofit/>
+          </a:bodyPr>
+          <a:lstStyle/>
+          <a:p>
+            <a:pPr algn="ctr"/>
+            <a:endParaRPr lang="en-US" sz="1600" dirty="0" smtClean="0">
+              <a:solidFill>
+                <a:schemeClr val="tx1"/>
+              </a:solidFill>
+            </a:endParaRPr>
+          </a:p>
+        </p:txBody>
+      </p:sp>
+      <p:sp>
+        <p:nvSpPr>
+          <p:cNvPr id="43" name="Rectangle 42"/>
+          <p:cNvSpPr/>
+          <p:nvPr/>
+        </p:nvSpPr>
+        <p:spPr>
+          <a:xfrm>
+            <a:off x="7038981" y="4370554"/>
+            <a:ext cx="1188000" cy="432000"/>
+          </a:xfrm>
+          <a:prstGeom prst="rect">
+            <a:avLst/>
+          </a:prstGeom>
+          <a:solidFill>
+            <a:srgbClr val="FFFFFF">
+              <a:alpha val="85000"/>
+            </a:srgbClr>
+          </a:solidFill>
+          <a:ln w="19050">
+            <a:solidFill>
+              <a:schemeClr val="accent6">
+                <a:lumMod val="60000"/>
+                <a:lumOff val="40000"/>
+              </a:schemeClr>
+            </a:solidFill>
+          </a:ln>
+        </p:spPr>
+        <p:style>
+          <a:lnRef idx="2">
+            <a:schemeClr val="accent1">
+              <a:shade val="50000"/>
+            </a:schemeClr>
+          </a:lnRef>
+          <a:fillRef idx="1">
+            <a:schemeClr val="accent1"/>
+          </a:fillRef>
+          <a:effectRef idx="0">
+            <a:schemeClr val="accent1"/>
+          </a:effectRef>
+          <a:fontRef idx="minor">
+            <a:schemeClr val="lt1"/>
+          </a:fontRef>
+        </p:style>
+        <p:txBody>
+          <a:bodyPr rtlCol="0" anchor="ctr"/>
+          <a:lstStyle/>
+          <a:p>
+            <a:pPr lvl="0" algn="ctr"/>
+            <a:r>
+              <a:rPr lang="de-DE" sz="1600" dirty="0">
+                <a:solidFill>
+                  <a:prstClr val="black"/>
+                </a:solidFill>
+              </a:rPr>
+              <a:t>All Auto</a:t>
+            </a:r>
+            <a:r>
+              <a:rPr lang="de-DE" sz="4000" dirty="0">
+                <a:solidFill>
+                  <a:prstClr val="black"/>
+                </a:solidFill>
+              </a:rPr>
+              <a:t/>
+            </a:r>
+            <a:br>
+              <a:rPr lang="de-DE" sz="4000" dirty="0">
+                <a:solidFill>
+                  <a:prstClr val="black"/>
+                </a:solidFill>
+              </a:rPr>
+            </a:br>
+            <a:r>
+              <a:rPr lang="de-DE" sz="600" dirty="0" err="1">
+                <a:solidFill>
+                  <a:prstClr val="black"/>
+                </a:solidFill>
+              </a:rPr>
+              <a:t>mrGearboxMogliCLUTCH</a:t>
+            </a:r>
+            <a:endParaRPr lang="en-US" sz="1200" dirty="0">
+              <a:solidFill>
+                <a:prstClr val="black"/>
+              </a:solidFill>
+            </a:endParaRPr>
+          </a:p>
+        </p:txBody>
+      </p:sp>
+      <p:cxnSp>
+        <p:nvCxnSpPr>
+          <p:cNvPr id="44" name="Straight Connector 43"/>
+          <p:cNvCxnSpPr>
+            <a:stCxn id="42" idx="2"/>
+            <a:endCxn id="43" idx="0"/>
+          </p:cNvCxnSpPr>
+          <p:nvPr/>
+        </p:nvCxnSpPr>
+        <p:spPr>
+          <a:xfrm>
+            <a:off x="6105458" y="4228389"/>
+            <a:ext cx="1527523" cy="142165"/>
+          </a:xfrm>
+          <a:prstGeom prst="line">
+            <a:avLst/>
+          </a:prstGeom>
+          <a:ln w="19050">
+            <a:solidFill>
+              <a:schemeClr val="accent6">
+                <a:lumMod val="60000"/>
+                <a:lumOff val="40000"/>
+              </a:schemeClr>
             </a:solidFill>
           </a:ln>
         </p:spPr>
@@ -8049,7 +8053,7 @@
         </p:nvSpPr>
         <p:spPr>
           <a:xfrm>
-            <a:off x="3982383" y="3560799"/>
+            <a:off x="3994064" y="3366655"/>
             <a:ext cx="1332000" cy="595120"/>
           </a:xfrm>
           <a:prstGeom prst="rect">
@@ -8507,8 +8511,8 @@
         </p:nvCxnSpPr>
         <p:spPr>
           <a:xfrm flipV="1">
-            <a:off x="5314383" y="3629424"/>
-            <a:ext cx="509721" cy="228935"/>
+            <a:off x="5326064" y="3629424"/>
+            <a:ext cx="498040" cy="34791"/>
           </a:xfrm>
           <a:prstGeom prst="line">
             <a:avLst/>
@@ -8971,6 +8975,220 @@
       </p:par>
     </p:tnLst>
   </p:timing>
+</p:sld>
+</file>
+
+<file path=ppt/slides/slide4.xml><?xml version="1.0" encoding="utf-8"?>
+<p:sld xmlns:a="http://schemas.openxmlformats.org/drawingml/2006/main" xmlns:r="http://schemas.openxmlformats.org/officeDocument/2006/relationships" xmlns:p="http://schemas.openxmlformats.org/presentationml/2006/main">
+  <p:cSld>
+    <p:spTree>
+      <p:nvGrpSpPr>
+        <p:cNvPr id="1" name=""/>
+        <p:cNvGrpSpPr/>
+        <p:nvPr/>
+      </p:nvGrpSpPr>
+      <p:grpSpPr>
+        <a:xfrm>
+          <a:off x="0" y="0"/>
+          <a:ext cx="0" cy="0"/>
+          <a:chOff x="0" y="0"/>
+          <a:chExt cx="0" cy="0"/>
+        </a:xfrm>
+      </p:grpSpPr>
+      <p:sp>
+        <p:nvSpPr>
+          <p:cNvPr id="2" name="Rectangle 1"/>
+          <p:cNvSpPr/>
+          <p:nvPr/>
+        </p:nvSpPr>
+        <p:spPr>
+          <a:xfrm>
+            <a:off x="4511587" y="4369351"/>
+            <a:ext cx="1188000" cy="432000"/>
+          </a:xfrm>
+          <a:prstGeom prst="rect">
+            <a:avLst/>
+          </a:prstGeom>
+          <a:solidFill>
+            <a:srgbClr val="FFFFFF">
+              <a:alpha val="85000"/>
+            </a:srgbClr>
+          </a:solidFill>
+          <a:ln w="19050">
+            <a:solidFill>
+              <a:schemeClr val="accent6">
+                <a:lumMod val="50000"/>
+              </a:schemeClr>
+            </a:solidFill>
+          </a:ln>
+        </p:spPr>
+        <p:style>
+          <a:lnRef idx="2">
+            <a:schemeClr val="accent1">
+              <a:shade val="50000"/>
+            </a:schemeClr>
+          </a:lnRef>
+          <a:fillRef idx="1">
+            <a:schemeClr val="accent1"/>
+          </a:fillRef>
+          <a:effectRef idx="0">
+            <a:schemeClr val="accent1"/>
+          </a:effectRef>
+          <a:fontRef idx="minor">
+            <a:schemeClr val="lt1"/>
+          </a:fontRef>
+        </p:style>
+        <p:txBody>
+          <a:bodyPr rtlCol="0" anchor="ctr"/>
+          <a:lstStyle/>
+          <a:p>
+            <a:pPr algn="ctr"/>
+            <a:r>
+              <a:rPr lang="de-DE" sz="1600" dirty="0" smtClean="0">
+                <a:solidFill>
+                  <a:schemeClr val="tx1"/>
+                </a:solidFill>
+              </a:rPr>
+              <a:t>All Auto</a:t>
+            </a:r>
+            <a:r>
+              <a:rPr lang="de-DE" sz="4000" dirty="0" smtClean="0">
+                <a:solidFill>
+                  <a:schemeClr val="tx1"/>
+                </a:solidFill>
+              </a:rPr>
+              <a:t/>
+            </a:r>
+            <a:br>
+              <a:rPr lang="de-DE" sz="4000" dirty="0" smtClean="0">
+                <a:solidFill>
+                  <a:schemeClr val="tx1"/>
+                </a:solidFill>
+              </a:rPr>
+            </a:br>
+            <a:r>
+              <a:rPr lang="de-DE" sz="600" dirty="0" err="1" smtClean="0">
+                <a:solidFill>
+                  <a:schemeClr val="tx1"/>
+                </a:solidFill>
+              </a:rPr>
+              <a:t>mrGearboxMogliCLUTCH</a:t>
+            </a:r>
+            <a:endParaRPr lang="en-US" sz="1200" dirty="0">
+              <a:solidFill>
+                <a:schemeClr val="tx1"/>
+              </a:solidFill>
+            </a:endParaRPr>
+          </a:p>
+        </p:txBody>
+      </p:sp>
+      <p:sp>
+        <p:nvSpPr>
+          <p:cNvPr id="3" name="Rectangle 2"/>
+          <p:cNvSpPr/>
+          <p:nvPr/>
+        </p:nvSpPr>
+        <p:spPr>
+          <a:xfrm>
+            <a:off x="5072677" y="3864706"/>
+            <a:ext cx="363682" cy="363683"/>
+          </a:xfrm>
+          <a:prstGeom prst="rect">
+            <a:avLst/>
+          </a:prstGeom>
+          <a:noFill/>
+          <a:ln w="19050">
+            <a:solidFill>
+              <a:schemeClr val="accent6">
+                <a:lumMod val="50000"/>
+              </a:schemeClr>
+            </a:solidFill>
+          </a:ln>
+        </p:spPr>
+        <p:style>
+          <a:lnRef idx="2">
+            <a:schemeClr val="accent1">
+              <a:shade val="50000"/>
+            </a:schemeClr>
+          </a:lnRef>
+          <a:fillRef idx="1">
+            <a:schemeClr val="accent1"/>
+          </a:fillRef>
+          <a:effectRef idx="0">
+            <a:schemeClr val="accent1"/>
+          </a:effectRef>
+          <a:fontRef idx="minor">
+            <a:schemeClr val="lt1"/>
+          </a:fontRef>
+        </p:style>
+        <p:txBody>
+          <a:bodyPr rot="0" spcFirstLastPara="0" vertOverflow="overflow" horzOverflow="overflow" vert="horz" wrap="square" lIns="91440" tIns="45720" rIns="91440" bIns="45720" numCol="1" spcCol="0" rtlCol="0" fromWordArt="0" anchor="ctr" anchorCtr="0" forceAA="0" compatLnSpc="1">
+            <a:prstTxWarp prst="textNoShape">
+              <a:avLst/>
+            </a:prstTxWarp>
+            <a:noAutofit/>
+          </a:bodyPr>
+          <a:lstStyle/>
+          <a:p>
+            <a:pPr algn="ctr"/>
+            <a:endParaRPr lang="en-US" sz="1600" dirty="0" smtClean="0">
+              <a:solidFill>
+                <a:schemeClr val="tx1"/>
+              </a:solidFill>
+            </a:endParaRPr>
+          </a:p>
+        </p:txBody>
+      </p:sp>
+      <p:cxnSp>
+        <p:nvCxnSpPr>
+          <p:cNvPr id="4" name="Straight Connector 3"/>
+          <p:cNvCxnSpPr>
+            <a:stCxn id="2" idx="0"/>
+            <a:endCxn id="3" idx="2"/>
+          </p:cNvCxnSpPr>
+          <p:nvPr/>
+        </p:nvCxnSpPr>
+        <p:spPr>
+          <a:xfrm flipV="1">
+            <a:off x="5105587" y="4228389"/>
+            <a:ext cx="148931" cy="140962"/>
+          </a:xfrm>
+          <a:prstGeom prst="line">
+            <a:avLst/>
+          </a:prstGeom>
+          <a:ln w="19050">
+            <a:solidFill>
+              <a:schemeClr val="accent6">
+                <a:lumMod val="50000"/>
+              </a:schemeClr>
+            </a:solidFill>
+          </a:ln>
+        </p:spPr>
+        <p:style>
+          <a:lnRef idx="1">
+            <a:schemeClr val="accent1"/>
+          </a:lnRef>
+          <a:fillRef idx="0">
+            <a:schemeClr val="accent1"/>
+          </a:fillRef>
+          <a:effectRef idx="0">
+            <a:schemeClr val="accent1"/>
+          </a:effectRef>
+          <a:fontRef idx="minor">
+            <a:schemeClr val="tx1"/>
+          </a:fontRef>
+        </p:style>
+      </p:cxnSp>
+    </p:spTree>
+    <p:extLst>
+      <p:ext uri="{BB962C8B-B14F-4D97-AF65-F5344CB8AC3E}">
+        <p14:creationId xmlns:p14="http://schemas.microsoft.com/office/powerpoint/2010/main" val="1965261842"/>
+      </p:ext>
+    </p:extLst>
+  </p:cSld>
+  <p:clrMapOvr>
+    <a:masterClrMapping/>
+  </p:clrMapOvr>
 </p:sld>
 </file>
 

</xml_diff>